<commit_message>
software outputs are now shown
</commit_message>
<xml_diff>
--- a/Deliverables/Canny edge detection – fpga speedup.pptx
+++ b/Deliverables/Canny edge detection – fpga speedup.pptx
@@ -5,7 +5,7 @@
     <p:sldMasterId id="2147483660" r:id="rId1"/>
   </p:sldMasterIdLst>
   <p:notesMasterIdLst>
-    <p:notesMasterId r:id="rId16"/>
+    <p:notesMasterId r:id="rId20"/>
   </p:notesMasterIdLst>
   <p:sldIdLst>
     <p:sldId id="256" r:id="rId2"/>
@@ -22,6 +22,10 @@
     <p:sldId id="263" r:id="rId13"/>
     <p:sldId id="260" r:id="rId14"/>
     <p:sldId id="271" r:id="rId15"/>
+    <p:sldId id="272" r:id="rId16"/>
+    <p:sldId id="273" r:id="rId17"/>
+    <p:sldId id="274" r:id="rId18"/>
+    <p:sldId id="275" r:id="rId19"/>
   </p:sldIdLst>
   <p:sldSz cx="12192000" cy="6858000"/>
   <p:notesSz cx="6858000" cy="9144000"/>
@@ -5199,6 +5203,556 @@
     <p:extLst>
       <p:ext uri="{BB962C8B-B14F-4D97-AF65-F5344CB8AC3E}">
         <p14:creationId xmlns:p14="http://schemas.microsoft.com/office/powerpoint/2010/main" val="219068459"/>
+      </p:ext>
+    </p:extLst>
+  </p:cSld>
+  <p:clrMapOvr>
+    <a:masterClrMapping/>
+  </p:clrMapOvr>
+</p:sld>
+</file>
+
+<file path=ppt/slides/slide15.xml><?xml version="1.0" encoding="utf-8"?>
+<p:sld xmlns:a="http://schemas.openxmlformats.org/drawingml/2006/main" xmlns:r="http://schemas.openxmlformats.org/officeDocument/2006/relationships" xmlns:p="http://schemas.openxmlformats.org/presentationml/2006/main">
+  <p:cSld>
+    <p:spTree>
+      <p:nvGrpSpPr>
+        <p:cNvPr id="1" name=""/>
+        <p:cNvGrpSpPr/>
+        <p:nvPr/>
+      </p:nvGrpSpPr>
+      <p:grpSpPr>
+        <a:xfrm>
+          <a:off x="0" y="0"/>
+          <a:ext cx="0" cy="0"/>
+          <a:chOff x="0" y="0"/>
+          <a:chExt cx="0" cy="0"/>
+        </a:xfrm>
+      </p:grpSpPr>
+      <p:sp>
+        <p:nvSpPr>
+          <p:cNvPr id="2" name="Title 1">
+            <a:extLst>
+              <a:ext uri="{FF2B5EF4-FFF2-40B4-BE49-F238E27FC236}">
+                <a16:creationId xmlns:a16="http://schemas.microsoft.com/office/drawing/2014/main" id="{5136C3ED-2364-47F5-A57F-EB1FA2AE2527}"/>
+              </a:ext>
+            </a:extLst>
+          </p:cNvPr>
+          <p:cNvSpPr>
+            <a:spLocks noGrp="1"/>
+          </p:cNvSpPr>
+          <p:nvPr>
+            <p:ph type="title"/>
+          </p:nvPr>
+        </p:nvSpPr>
+        <p:spPr/>
+        <p:txBody>
+          <a:bodyPr/>
+          <a:lstStyle/>
+          <a:p>
+            <a:r>
+              <a:rPr lang="en-US" dirty="0"/>
+              <a:t>Image recreation glitch</a:t>
+            </a:r>
+          </a:p>
+        </p:txBody>
+      </p:sp>
+      <p:sp>
+        <p:nvSpPr>
+          <p:cNvPr id="3" name="Text Placeholder 2">
+            <a:extLst>
+              <a:ext uri="{FF2B5EF4-FFF2-40B4-BE49-F238E27FC236}">
+                <a16:creationId xmlns:a16="http://schemas.microsoft.com/office/drawing/2014/main" id="{0FF091CE-196B-4EA4-B845-1664A8E1BA2C}"/>
+              </a:ext>
+            </a:extLst>
+          </p:cNvPr>
+          <p:cNvSpPr>
+            <a:spLocks noGrp="1"/>
+          </p:cNvSpPr>
+          <p:nvPr>
+            <p:ph type="body" idx="1"/>
+          </p:nvPr>
+        </p:nvSpPr>
+        <p:spPr/>
+        <p:txBody>
+          <a:bodyPr/>
+          <a:lstStyle/>
+          <a:p>
+            <a:r>
+              <a:rPr lang="en-US" dirty="0"/>
+              <a:t>How software recreated image</a:t>
+            </a:r>
+          </a:p>
+        </p:txBody>
+      </p:sp>
+      <p:sp>
+        <p:nvSpPr>
+          <p:cNvPr id="5" name="Text Placeholder 4">
+            <a:extLst>
+              <a:ext uri="{FF2B5EF4-FFF2-40B4-BE49-F238E27FC236}">
+                <a16:creationId xmlns:a16="http://schemas.microsoft.com/office/drawing/2014/main" id="{E95CCB12-E0A3-4CF4-9BD7-A6388AE7C6A4}"/>
+              </a:ext>
+            </a:extLst>
+          </p:cNvPr>
+          <p:cNvSpPr>
+            <a:spLocks noGrp="1"/>
+          </p:cNvSpPr>
+          <p:nvPr>
+            <p:ph type="body" sz="quarter" idx="3"/>
+          </p:nvPr>
+        </p:nvSpPr>
+        <p:spPr/>
+        <p:txBody>
+          <a:bodyPr/>
+          <a:lstStyle/>
+          <a:p>
+            <a:r>
+              <a:rPr lang="en-US" dirty="0"/>
+              <a:t>What it should look like</a:t>
+            </a:r>
+          </a:p>
+        </p:txBody>
+      </p:sp>
+      <p:pic>
+        <p:nvPicPr>
+          <p:cNvPr id="7" name="Content Placeholder 6">
+            <a:extLst>
+              <a:ext uri="{FF2B5EF4-FFF2-40B4-BE49-F238E27FC236}">
+                <a16:creationId xmlns:a16="http://schemas.microsoft.com/office/drawing/2014/main" id="{0B5FCDED-3EBB-417C-8671-D762F0CB2013}"/>
+              </a:ext>
+            </a:extLst>
+          </p:cNvPr>
+          <p:cNvPicPr>
+            <a:picLocks noGrp="1"/>
+          </p:cNvPicPr>
+          <p:nvPr>
+            <p:ph sz="half" idx="2"/>
+          </p:nvPr>
+        </p:nvPicPr>
+        <p:blipFill>
+          <a:blip r:embed="rId2"/>
+          <a:stretch>
+            <a:fillRect/>
+          </a:stretch>
+        </p:blipFill>
+        <p:spPr>
+          <a:xfrm>
+            <a:off x="2253673" y="3161661"/>
+            <a:ext cx="2426566" cy="1966091"/>
+          </a:xfrm>
+          <a:prstGeom prst="rect">
+            <a:avLst/>
+          </a:prstGeom>
+        </p:spPr>
+      </p:pic>
+      <p:pic>
+        <p:nvPicPr>
+          <p:cNvPr id="8" name="Content Placeholder 7">
+            <a:extLst>
+              <a:ext uri="{FF2B5EF4-FFF2-40B4-BE49-F238E27FC236}">
+                <a16:creationId xmlns:a16="http://schemas.microsoft.com/office/drawing/2014/main" id="{23D276B5-D4D2-4E10-9FB1-CCFC934AAD31}"/>
+              </a:ext>
+            </a:extLst>
+          </p:cNvPr>
+          <p:cNvPicPr>
+            <a:picLocks noGrp="1"/>
+          </p:cNvPicPr>
+          <p:nvPr>
+            <p:ph sz="quarter" idx="4"/>
+          </p:nvPr>
+        </p:nvPicPr>
+        <p:blipFill rotWithShape="1">
+          <a:blip r:embed="rId3"/>
+          <a:srcRect r="47938"/>
+          <a:stretch/>
+        </p:blipFill>
+        <p:spPr bwMode="auto">
+          <a:xfrm>
+            <a:off x="7511763" y="3161660"/>
+            <a:ext cx="2112528" cy="1966091"/>
+          </a:xfrm>
+          <a:prstGeom prst="rect">
+            <a:avLst/>
+          </a:prstGeom>
+          <a:ln>
+            <a:noFill/>
+          </a:ln>
+          <a:extLst>
+            <a:ext uri="{53640926-AAD7-44D8-BBD7-CCE9431645EC}">
+              <a14:shadowObscured xmlns:a14="http://schemas.microsoft.com/office/drawing/2010/main"/>
+            </a:ext>
+          </a:extLst>
+        </p:spPr>
+      </p:pic>
+    </p:spTree>
+    <p:extLst>
+      <p:ext uri="{BB962C8B-B14F-4D97-AF65-F5344CB8AC3E}">
+        <p14:creationId xmlns:p14="http://schemas.microsoft.com/office/powerpoint/2010/main" val="3974080755"/>
+      </p:ext>
+    </p:extLst>
+  </p:cSld>
+  <p:clrMapOvr>
+    <a:masterClrMapping/>
+  </p:clrMapOvr>
+</p:sld>
+</file>
+
+<file path=ppt/slides/slide16.xml><?xml version="1.0" encoding="utf-8"?>
+<p:sld xmlns:a="http://schemas.openxmlformats.org/drawingml/2006/main" xmlns:r="http://schemas.openxmlformats.org/officeDocument/2006/relationships" xmlns:p="http://schemas.openxmlformats.org/presentationml/2006/main">
+  <p:cSld>
+    <p:spTree>
+      <p:nvGrpSpPr>
+        <p:cNvPr id="1" name=""/>
+        <p:cNvGrpSpPr/>
+        <p:nvPr/>
+      </p:nvGrpSpPr>
+      <p:grpSpPr>
+        <a:xfrm>
+          <a:off x="0" y="0"/>
+          <a:ext cx="0" cy="0"/>
+          <a:chOff x="0" y="0"/>
+          <a:chExt cx="0" cy="0"/>
+        </a:xfrm>
+      </p:grpSpPr>
+      <p:sp>
+        <p:nvSpPr>
+          <p:cNvPr id="2" name="Title 1">
+            <a:extLst>
+              <a:ext uri="{FF2B5EF4-FFF2-40B4-BE49-F238E27FC236}">
+                <a16:creationId xmlns:a16="http://schemas.microsoft.com/office/drawing/2014/main" id="{180777D6-5B74-4286-9CD2-DA3CF1C1DD9A}"/>
+              </a:ext>
+            </a:extLst>
+          </p:cNvPr>
+          <p:cNvSpPr>
+            <a:spLocks noGrp="1"/>
+          </p:cNvSpPr>
+          <p:nvPr>
+            <p:ph type="title"/>
+          </p:nvPr>
+        </p:nvSpPr>
+        <p:spPr/>
+        <p:txBody>
+          <a:bodyPr/>
+          <a:lstStyle/>
+          <a:p>
+            <a:r>
+              <a:rPr lang="en-US" dirty="0"/>
+              <a:t>Example outputs</a:t>
+            </a:r>
+          </a:p>
+        </p:txBody>
+      </p:sp>
+      <p:pic>
+        <p:nvPicPr>
+          <p:cNvPr id="4" name="Content Placeholder 3">
+            <a:extLst>
+              <a:ext uri="{FF2B5EF4-FFF2-40B4-BE49-F238E27FC236}">
+                <a16:creationId xmlns:a16="http://schemas.microsoft.com/office/drawing/2014/main" id="{FD540077-2E5D-46E0-B0B3-7972DA5A507D}"/>
+              </a:ext>
+            </a:extLst>
+          </p:cNvPr>
+          <p:cNvPicPr>
+            <a:picLocks noGrp="1" noChangeAspect="1"/>
+          </p:cNvPicPr>
+          <p:nvPr>
+            <p:ph idx="1"/>
+          </p:nvPr>
+        </p:nvPicPr>
+        <p:blipFill>
+          <a:blip r:embed="rId2"/>
+          <a:stretch>
+            <a:fillRect/>
+          </a:stretch>
+        </p:blipFill>
+        <p:spPr>
+          <a:xfrm>
+            <a:off x="2354227" y="2604654"/>
+            <a:ext cx="7219842" cy="2182163"/>
+          </a:xfrm>
+          <a:prstGeom prst="rect">
+            <a:avLst/>
+          </a:prstGeom>
+        </p:spPr>
+      </p:pic>
+    </p:spTree>
+    <p:extLst>
+      <p:ext uri="{BB962C8B-B14F-4D97-AF65-F5344CB8AC3E}">
+        <p14:creationId xmlns:p14="http://schemas.microsoft.com/office/powerpoint/2010/main" val="2920089391"/>
+      </p:ext>
+    </p:extLst>
+  </p:cSld>
+  <p:clrMapOvr>
+    <a:masterClrMapping/>
+  </p:clrMapOvr>
+</p:sld>
+</file>
+
+<file path=ppt/slides/slide17.xml><?xml version="1.0" encoding="utf-8"?>
+<p:sld xmlns:a="http://schemas.openxmlformats.org/drawingml/2006/main" xmlns:r="http://schemas.openxmlformats.org/officeDocument/2006/relationships" xmlns:p="http://schemas.openxmlformats.org/presentationml/2006/main">
+  <p:cSld>
+    <p:spTree>
+      <p:nvGrpSpPr>
+        <p:cNvPr id="1" name=""/>
+        <p:cNvGrpSpPr/>
+        <p:nvPr/>
+      </p:nvGrpSpPr>
+      <p:grpSpPr>
+        <a:xfrm>
+          <a:off x="0" y="0"/>
+          <a:ext cx="0" cy="0"/>
+          <a:chOff x="0" y="0"/>
+          <a:chExt cx="0" cy="0"/>
+        </a:xfrm>
+      </p:grpSpPr>
+      <p:sp>
+        <p:nvSpPr>
+          <p:cNvPr id="2" name="Title 1">
+            <a:extLst>
+              <a:ext uri="{FF2B5EF4-FFF2-40B4-BE49-F238E27FC236}">
+                <a16:creationId xmlns:a16="http://schemas.microsoft.com/office/drawing/2014/main" id="{FA365401-B5DE-4D43-8A6C-B4F6954F1F0C}"/>
+              </a:ext>
+            </a:extLst>
+          </p:cNvPr>
+          <p:cNvSpPr>
+            <a:spLocks noGrp="1"/>
+          </p:cNvSpPr>
+          <p:nvPr>
+            <p:ph type="title"/>
+          </p:nvPr>
+        </p:nvSpPr>
+        <p:spPr/>
+        <p:txBody>
+          <a:bodyPr/>
+          <a:lstStyle/>
+          <a:p>
+            <a:r>
+              <a:rPr lang="en-US" dirty="0"/>
+              <a:t>Example outputs</a:t>
+            </a:r>
+          </a:p>
+        </p:txBody>
+      </p:sp>
+      <p:pic>
+        <p:nvPicPr>
+          <p:cNvPr id="4" name="Content Placeholder 3">
+            <a:extLst>
+              <a:ext uri="{FF2B5EF4-FFF2-40B4-BE49-F238E27FC236}">
+                <a16:creationId xmlns:a16="http://schemas.microsoft.com/office/drawing/2014/main" id="{F09D082D-217A-4EC1-8365-6FF38F351D37}"/>
+              </a:ext>
+            </a:extLst>
+          </p:cNvPr>
+          <p:cNvPicPr>
+            <a:picLocks noGrp="1" noChangeAspect="1"/>
+          </p:cNvPicPr>
+          <p:nvPr>
+            <p:ph idx="1"/>
+          </p:nvPr>
+        </p:nvPicPr>
+        <p:blipFill>
+          <a:blip r:embed="rId2"/>
+          <a:stretch>
+            <a:fillRect/>
+          </a:stretch>
+        </p:blipFill>
+        <p:spPr>
+          <a:xfrm>
+            <a:off x="2477132" y="2641600"/>
+            <a:ext cx="7237735" cy="2121405"/>
+          </a:xfrm>
+          <a:prstGeom prst="rect">
+            <a:avLst/>
+          </a:prstGeom>
+        </p:spPr>
+      </p:pic>
+    </p:spTree>
+    <p:extLst>
+      <p:ext uri="{BB962C8B-B14F-4D97-AF65-F5344CB8AC3E}">
+        <p14:creationId xmlns:p14="http://schemas.microsoft.com/office/powerpoint/2010/main" val="1464803244"/>
+      </p:ext>
+    </p:extLst>
+  </p:cSld>
+  <p:clrMapOvr>
+    <a:masterClrMapping/>
+  </p:clrMapOvr>
+</p:sld>
+</file>
+
+<file path=ppt/slides/slide18.xml><?xml version="1.0" encoding="utf-8"?>
+<p:sld xmlns:a="http://schemas.openxmlformats.org/drawingml/2006/main" xmlns:r="http://schemas.openxmlformats.org/officeDocument/2006/relationships" xmlns:p="http://schemas.openxmlformats.org/presentationml/2006/main">
+  <p:cSld>
+    <p:spTree>
+      <p:nvGrpSpPr>
+        <p:cNvPr id="1" name=""/>
+        <p:cNvGrpSpPr/>
+        <p:nvPr/>
+      </p:nvGrpSpPr>
+      <p:grpSpPr>
+        <a:xfrm>
+          <a:off x="0" y="0"/>
+          <a:ext cx="0" cy="0"/>
+          <a:chOff x="0" y="0"/>
+          <a:chExt cx="0" cy="0"/>
+        </a:xfrm>
+      </p:grpSpPr>
+      <p:sp>
+        <p:nvSpPr>
+          <p:cNvPr id="2" name="Title 1">
+            <a:extLst>
+              <a:ext uri="{FF2B5EF4-FFF2-40B4-BE49-F238E27FC236}">
+                <a16:creationId xmlns:a16="http://schemas.microsoft.com/office/drawing/2014/main" id="{BFDE2D91-9125-4DA9-BCBD-5C05AAF40C28}"/>
+              </a:ext>
+            </a:extLst>
+          </p:cNvPr>
+          <p:cNvSpPr>
+            <a:spLocks noGrp="1"/>
+          </p:cNvSpPr>
+          <p:nvPr>
+            <p:ph type="title"/>
+          </p:nvPr>
+        </p:nvSpPr>
+        <p:spPr/>
+        <p:txBody>
+          <a:bodyPr/>
+          <a:lstStyle/>
+          <a:p>
+            <a:r>
+              <a:rPr lang="en-US" dirty="0"/>
+              <a:t>Thresholding sensitivity</a:t>
+            </a:r>
+          </a:p>
+        </p:txBody>
+      </p:sp>
+      <p:sp>
+        <p:nvSpPr>
+          <p:cNvPr id="3" name="Text Placeholder 2">
+            <a:extLst>
+              <a:ext uri="{FF2B5EF4-FFF2-40B4-BE49-F238E27FC236}">
+                <a16:creationId xmlns:a16="http://schemas.microsoft.com/office/drawing/2014/main" id="{53050F73-D5C0-4818-A977-F09F45280699}"/>
+              </a:ext>
+            </a:extLst>
+          </p:cNvPr>
+          <p:cNvSpPr>
+            <a:spLocks noGrp="1"/>
+          </p:cNvSpPr>
+          <p:nvPr>
+            <p:ph type="body" idx="1"/>
+          </p:nvPr>
+        </p:nvSpPr>
+        <p:spPr/>
+        <p:txBody>
+          <a:bodyPr/>
+          <a:lstStyle/>
+          <a:p>
+            <a:r>
+              <a:rPr lang="en-US" dirty="0"/>
+              <a:t>Lower level</a:t>
+            </a:r>
+          </a:p>
+        </p:txBody>
+      </p:sp>
+      <p:sp>
+        <p:nvSpPr>
+          <p:cNvPr id="5" name="Text Placeholder 4">
+            <a:extLst>
+              <a:ext uri="{FF2B5EF4-FFF2-40B4-BE49-F238E27FC236}">
+                <a16:creationId xmlns:a16="http://schemas.microsoft.com/office/drawing/2014/main" id="{B62E21D6-C855-49F6-9BF9-8A0A4CBA2B67}"/>
+              </a:ext>
+            </a:extLst>
+          </p:cNvPr>
+          <p:cNvSpPr>
+            <a:spLocks noGrp="1"/>
+          </p:cNvSpPr>
+          <p:nvPr>
+            <p:ph type="body" sz="quarter" idx="3"/>
+          </p:nvPr>
+        </p:nvSpPr>
+        <p:spPr/>
+        <p:txBody>
+          <a:bodyPr/>
+          <a:lstStyle/>
+          <a:p>
+            <a:r>
+              <a:rPr lang="en-US" dirty="0"/>
+              <a:t>Higher level</a:t>
+            </a:r>
+          </a:p>
+        </p:txBody>
+      </p:sp>
+      <p:pic>
+        <p:nvPicPr>
+          <p:cNvPr id="8" name="Content Placeholder 7">
+            <a:extLst>
+              <a:ext uri="{FF2B5EF4-FFF2-40B4-BE49-F238E27FC236}">
+                <a16:creationId xmlns:a16="http://schemas.microsoft.com/office/drawing/2014/main" id="{C80294EF-9604-4D84-90A3-EC5C7FF3844D}"/>
+              </a:ext>
+            </a:extLst>
+          </p:cNvPr>
+          <p:cNvPicPr>
+            <a:picLocks noGrp="1" noChangeAspect="1"/>
+          </p:cNvPicPr>
+          <p:nvPr>
+            <p:ph sz="quarter" idx="4"/>
+          </p:nvPr>
+        </p:nvPicPr>
+        <p:blipFill>
+          <a:blip r:embed="rId2"/>
+          <a:stretch>
+            <a:fillRect/>
+          </a:stretch>
+        </p:blipFill>
+        <p:spPr>
+          <a:xfrm>
+            <a:off x="7144333" y="3242219"/>
+            <a:ext cx="2103870" cy="1725174"/>
+          </a:xfrm>
+          <a:prstGeom prst="rect">
+            <a:avLst/>
+          </a:prstGeom>
+        </p:spPr>
+      </p:pic>
+      <p:pic>
+        <p:nvPicPr>
+          <p:cNvPr id="7" name="Content Placeholder 6">
+            <a:extLst>
+              <a:ext uri="{FF2B5EF4-FFF2-40B4-BE49-F238E27FC236}">
+                <a16:creationId xmlns:a16="http://schemas.microsoft.com/office/drawing/2014/main" id="{51CEBFB1-7FB7-4E3A-A80F-BD792BA1C5D3}"/>
+              </a:ext>
+            </a:extLst>
+          </p:cNvPr>
+          <p:cNvPicPr>
+            <a:picLocks noGrp="1"/>
+          </p:cNvPicPr>
+          <p:nvPr>
+            <p:ph sz="half" idx="2"/>
+          </p:nvPr>
+        </p:nvPicPr>
+        <p:blipFill rotWithShape="1">
+          <a:blip r:embed="rId3"/>
+          <a:srcRect r="48470"/>
+          <a:stretch/>
+        </p:blipFill>
+        <p:spPr bwMode="auto">
+          <a:xfrm>
+            <a:off x="1838037" y="3242219"/>
+            <a:ext cx="2191610" cy="1677266"/>
+          </a:xfrm>
+          <a:prstGeom prst="rect">
+            <a:avLst/>
+          </a:prstGeom>
+          <a:ln>
+            <a:noFill/>
+          </a:ln>
+          <a:extLst>
+            <a:ext uri="{53640926-AAD7-44D8-BBD7-CCE9431645EC}">
+              <a14:shadowObscured xmlns:a14="http://schemas.microsoft.com/office/drawing/2010/main"/>
+            </a:ext>
+          </a:extLst>
+        </p:spPr>
+      </p:pic>
+    </p:spTree>
+    <p:extLst>
+      <p:ext uri="{BB962C8B-B14F-4D97-AF65-F5344CB8AC3E}">
+        <p14:creationId xmlns:p14="http://schemas.microsoft.com/office/powerpoint/2010/main" val="984301346"/>
       </p:ext>
     </p:extLst>
   </p:cSld>

</xml_diff>